<commit_message>
Update user manual & power point
</commit_message>
<xml_diff>
--- a/studytracker/documentation/slacker-hacker-presentation.pptx
+++ b/studytracker/documentation/slacker-hacker-presentation.pptx
@@ -5952,8 +5952,8 @@
         </p:blipFill>
         <p:spPr>
           <a:xfrm>
-            <a:off x="5263348" y="1332565"/>
-            <a:ext cx="6325902" cy="3948351"/>
+            <a:off x="5263347" y="1639398"/>
+            <a:ext cx="6572481" cy="3847002"/>
           </a:xfrm>
         </p:spPr>
       </p:pic>
@@ -6431,73 +6431,118 @@
           <a:bodyPr/>
           <a:lstStyle/>
           <a:p>
-            <a:pPr algn="r"/>
+            <a:pPr marL="285750" indent="-285750" algn="l">
+              <a:buFontTx/>
+              <a:buChar char="-"/>
+            </a:pPr>
+            <a:r>
+              <a:rPr lang="en-US" dirty="0" smtClean="0"/>
+              <a:t>Vuong: Front-end design (new tab), TO-DO list.</a:t>
+            </a:r>
+          </a:p>
+          <a:p>
+            <a:pPr marL="285750" indent="-285750" algn="l">
+              <a:buFontTx/>
+              <a:buChar char="-"/>
+            </a:pPr>
+            <a:r>
+              <a:rPr lang="en-US" dirty="0" smtClean="0"/>
+              <a:t>Luke </a:t>
+            </a:r>
+            <a:r>
+              <a:rPr lang="en-US" dirty="0" err="1" smtClean="0"/>
+              <a:t>Dercher</a:t>
+            </a:r>
+            <a:r>
+              <a:rPr lang="en-US" dirty="0" smtClean="0"/>
+              <a:t>: Blocking Pop-up, Test suite, Timer.</a:t>
+            </a:r>
+          </a:p>
+          <a:p>
+            <a:pPr marL="285750" indent="-285750" algn="l">
+              <a:buFontTx/>
+              <a:buChar char="-"/>
+            </a:pPr>
+            <a:r>
+              <a:rPr lang="en-US" dirty="0" smtClean="0"/>
+              <a:t>Luke Weber: Data </a:t>
+            </a:r>
             <a:r>
               <a:rPr lang="en-US" dirty="0"/>
-              <a:t>Vuong </a:t>
-            </a:r>
-            <a:r>
-              <a:rPr lang="en-US"/>
-              <a:t>Nguyen </a:t>
-            </a:r>
-            <a:endParaRPr lang="en-US" smtClean="0"/>
-          </a:p>
-          <a:p>
-            <a:pPr algn="r"/>
-            <a:r>
-              <a:rPr lang="en-US" smtClean="0"/>
-              <a:t>Luke </a:t>
-            </a:r>
-            <a:r>
-              <a:rPr lang="en-US" dirty="0" err="1"/>
-              <a:t>Dercher</a:t>
-            </a:r>
-            <a:endParaRPr lang="en-US" dirty="0"/>
-          </a:p>
-          <a:p>
-            <a:pPr algn="r"/>
-            <a:r>
-              <a:rPr lang="en-US" dirty="0"/>
-              <a:t>Luke Weber </a:t>
-            </a:r>
-          </a:p>
-          <a:p>
-            <a:pPr algn="r"/>
+              <a:t>analysis (graphs</a:t>
+            </a:r>
+            <a:r>
+              <a:rPr lang="en-US" dirty="0" smtClean="0"/>
+              <a:t>), Timer.</a:t>
+            </a:r>
+          </a:p>
+          <a:p>
+            <a:pPr marL="285750" indent="-285750" algn="l">
+              <a:buFontTx/>
+              <a:buChar char="-"/>
+            </a:pPr>
             <a:r>
               <a:rPr lang="en-US" dirty="0"/>
               <a:t>Dylan </a:t>
             </a:r>
             <a:r>
+              <a:rPr lang="en-US" dirty="0" err="1" smtClean="0"/>
+              <a:t>Egnoske</a:t>
+            </a:r>
+            <a:r>
+              <a:rPr lang="en-US" dirty="0" smtClean="0"/>
+              <a:t>: </a:t>
+            </a:r>
+            <a:r>
+              <a:rPr lang="en-US" dirty="0"/>
+              <a:t>Initial Chrome extension </a:t>
+            </a:r>
+            <a:r>
+              <a:rPr lang="en-US" dirty="0" smtClean="0"/>
+              <a:t>setups and front-end design, Bad timer.</a:t>
+            </a:r>
+            <a:endParaRPr lang="en-US" dirty="0"/>
+          </a:p>
+          <a:p>
+            <a:pPr marL="285750" indent="-285750" algn="l">
+              <a:buFontTx/>
+              <a:buChar char="-"/>
+            </a:pPr>
+            <a:r>
+              <a:rPr lang="en-US" dirty="0"/>
+              <a:t>Sri </a:t>
+            </a:r>
+            <a:r>
               <a:rPr lang="en-US" dirty="0" err="1"/>
-              <a:t>Egnoske</a:t>
+              <a:t>Gayatri</a:t>
             </a:r>
             <a:r>
               <a:rPr lang="en-US" dirty="0"/>
               <a:t> </a:t>
             </a:r>
-          </a:p>
-          <a:p>
-            <a:pPr algn="r"/>
-            <a:r>
-              <a:rPr lang="en-US" dirty="0"/>
-              <a:t>Sri </a:t>
-            </a:r>
-            <a:r>
-              <a:rPr lang="en-US" dirty="0" err="1"/>
-              <a:t>Gayatri</a:t>
-            </a:r>
-            <a:r>
-              <a:rPr lang="en-US" dirty="0"/>
-              <a:t> </a:t>
-            </a:r>
-            <a:r>
-              <a:rPr lang="en-US" dirty="0" err="1"/>
+            <a:r>
+              <a:rPr lang="en-US" dirty="0" err="1" smtClean="0"/>
               <a:t>Sundar</a:t>
             </a:r>
-            <a:endParaRPr lang="en-US" dirty="0"/>
+            <a:r>
+              <a:rPr lang="en-US" dirty="0" smtClean="0"/>
+              <a:t>: Block websites (database &amp; </a:t>
+            </a:r>
+            <a:r>
+              <a:rPr lang="en-US" dirty="0" err="1" smtClean="0"/>
+              <a:t>php</a:t>
+            </a:r>
+            <a:r>
+              <a:rPr lang="en-US" dirty="0" smtClean="0"/>
+              <a:t> work), share on social media.</a:t>
+            </a:r>
           </a:p>
           <a:p>
             <a:pPr algn="l"/>
+            <a:r>
+              <a:rPr lang="en-US" dirty="0" smtClean="0"/>
+              <a:t>ALL: User Manual, Documentation, Bug list, Diagrams, Testing. </a:t>
+            </a:r>
             <a:endParaRPr lang="en-US" dirty="0"/>
           </a:p>
         </p:txBody>

</xml_diff>